<commit_message>
Small updates on the powerpoint
Spell checking
Adding a little more
</commit_message>
<xml_diff>
--- a/V2.1.0.pptx
+++ b/V2.1.0.pptx
@@ -113,7 +113,16 @@
       </a:defRPr>
     </a:lvl9pPr>
   </p:defaultTextStyle>
+  <p:extLst>
+    <p:ext uri="{EFAFB233-063F-42B5-8137-9DF3F51BA10A}">
+      <p15:sldGuideLst xmlns:p15="http://schemas.microsoft.com/office/powerpoint/2012/main"/>
+    </p:ext>
+  </p:extLst>
 </p:presentation>
+</file>
+
+<file path=ppt/revisionInfo.xml><?xml version="1.0" encoding="utf-8"?>
+<p1510:revInfo xmlns:a="http://schemas.openxmlformats.org/drawingml/2006/main" xmlns:r="http://schemas.openxmlformats.org/officeDocument/2006/relationships" xmlns:p1510="http://schemas.microsoft.com/office/powerpoint/2015/10/main"/>
 </file>
 
 <file path=ppt/slideLayouts/slideLayout1.xml><?xml version="1.0" encoding="utf-8"?>
@@ -839,7 +848,7 @@
             <a:fld id="{B61BEF0D-F0BB-DE4B-95CE-6DB70DBA9567}" type="datetimeFigureOut">
               <a:rPr lang="en-US" dirty="0"/>
               <a:pPr/>
-              <a:t>25-Sep-17</a:t>
+              <a:t>26-Sep-17</a:t>
             </a:fld>
             <a:endParaRPr lang="en-US" dirty="0"/>
           </a:p>
@@ -1087,7 +1096,7 @@
             <a:fld id="{B61BEF0D-F0BB-DE4B-95CE-6DB70DBA9567}" type="datetimeFigureOut">
               <a:rPr lang="en-US" dirty="0"/>
               <a:pPr/>
-              <a:t>25-Sep-17</a:t>
+              <a:t>26-Sep-17</a:t>
             </a:fld>
             <a:endParaRPr lang="en-US" dirty="0"/>
           </a:p>
@@ -1398,7 +1407,7 @@
             <a:fld id="{B61BEF0D-F0BB-DE4B-95CE-6DB70DBA9567}" type="datetimeFigureOut">
               <a:rPr lang="en-US" dirty="0"/>
               <a:pPr/>
-              <a:t>25-Sep-17</a:t>
+              <a:t>26-Sep-17</a:t>
             </a:fld>
             <a:endParaRPr lang="en-US" dirty="0"/>
           </a:p>
@@ -1736,7 +1745,7 @@
             <a:fld id="{B61BEF0D-F0BB-DE4B-95CE-6DB70DBA9567}" type="datetimeFigureOut">
               <a:rPr lang="en-US" dirty="0"/>
               <a:pPr/>
-              <a:t>25-Sep-17</a:t>
+              <a:t>26-Sep-17</a:t>
             </a:fld>
             <a:endParaRPr lang="en-US" dirty="0"/>
           </a:p>
@@ -2047,7 +2056,7 @@
             <a:fld id="{B61BEF0D-F0BB-DE4B-95CE-6DB70DBA9567}" type="datetimeFigureOut">
               <a:rPr lang="en-US" dirty="0"/>
               <a:pPr/>
-              <a:t>25-Sep-17</a:t>
+              <a:t>26-Sep-17</a:t>
             </a:fld>
             <a:endParaRPr lang="en-US" dirty="0"/>
           </a:p>
@@ -2437,7 +2446,7 @@
             <a:fld id="{B61BEF0D-F0BB-DE4B-95CE-6DB70DBA9567}" type="datetimeFigureOut">
               <a:rPr lang="en-US" dirty="0"/>
               <a:pPr/>
-              <a:t>25-Sep-17</a:t>
+              <a:t>26-Sep-17</a:t>
             </a:fld>
             <a:endParaRPr lang="en-US" dirty="0"/>
           </a:p>
@@ -2603,7 +2612,7 @@
           <a:p>
             <a:fld id="{55C6B4A9-1611-4792-9094-5F34BCA07E0B}" type="datetimeFigureOut">
               <a:rPr lang="en-US" dirty="0"/>
-              <a:t>25-Sep-17</a:t>
+              <a:t>26-Sep-17</a:t>
             </a:fld>
             <a:endParaRPr lang="en-US" dirty="0"/>
           </a:p>
@@ -2779,7 +2788,7 @@
             <a:fld id="{B61BEF0D-F0BB-DE4B-95CE-6DB70DBA9567}" type="datetimeFigureOut">
               <a:rPr lang="en-US" dirty="0"/>
               <a:pPr/>
-              <a:t>25-Sep-17</a:t>
+              <a:t>26-Sep-17</a:t>
             </a:fld>
             <a:endParaRPr lang="en-US" dirty="0"/>
           </a:p>
@@ -2952,7 +2961,7 @@
             <a:fld id="{B61BEF0D-F0BB-DE4B-95CE-6DB70DBA9567}" type="datetimeFigureOut">
               <a:rPr lang="en-US" dirty="0"/>
               <a:pPr/>
-              <a:t>25-Sep-17</a:t>
+              <a:t>26-Sep-17</a:t>
             </a:fld>
             <a:endParaRPr lang="en-US" dirty="0"/>
           </a:p>
@@ -3196,7 +3205,7 @@
             <a:fld id="{B61BEF0D-F0BB-DE4B-95CE-6DB70DBA9567}" type="datetimeFigureOut">
               <a:rPr lang="en-US" dirty="0"/>
               <a:pPr/>
-              <a:t>25-Sep-17</a:t>
+              <a:t>26-Sep-17</a:t>
             </a:fld>
             <a:endParaRPr lang="en-US" dirty="0"/>
           </a:p>
@@ -3424,7 +3433,7 @@
           <a:p>
             <a:fld id="{EB712588-04B1-427B-82EE-E8DB90309F08}" type="datetimeFigureOut">
               <a:rPr lang="en-US" dirty="0"/>
-              <a:t>25-Sep-17</a:t>
+              <a:t>26-Sep-17</a:t>
             </a:fld>
             <a:endParaRPr lang="en-US" dirty="0"/>
           </a:p>
@@ -3794,7 +3803,7 @@
             <a:fld id="{B61BEF0D-F0BB-DE4B-95CE-6DB70DBA9567}" type="datetimeFigureOut">
               <a:rPr lang="en-US" dirty="0"/>
               <a:pPr/>
-              <a:t>25-Sep-17</a:t>
+              <a:t>26-Sep-17</a:t>
             </a:fld>
             <a:endParaRPr lang="en-US" dirty="0"/>
           </a:p>
@@ -3914,7 +3923,7 @@
             <a:fld id="{B61BEF0D-F0BB-DE4B-95CE-6DB70DBA9567}" type="datetimeFigureOut">
               <a:rPr lang="en-US" dirty="0"/>
               <a:pPr/>
-              <a:t>25-Sep-17</a:t>
+              <a:t>26-Sep-17</a:t>
             </a:fld>
             <a:endParaRPr lang="en-US" dirty="0"/>
           </a:p>
@@ -4006,7 +4015,7 @@
             <a:fld id="{B61BEF0D-F0BB-DE4B-95CE-6DB70DBA9567}" type="datetimeFigureOut">
               <a:rPr lang="en-US" dirty="0"/>
               <a:pPr/>
-              <a:t>25-Sep-17</a:t>
+              <a:t>26-Sep-17</a:t>
             </a:fld>
             <a:endParaRPr lang="en-US" dirty="0"/>
           </a:p>
@@ -4257,7 +4266,7 @@
           <a:p>
             <a:fld id="{42A54C80-263E-416B-A8E0-580EDEADCBDC}" type="datetimeFigureOut">
               <a:rPr lang="en-US" dirty="0"/>
-              <a:t>25-Sep-17</a:t>
+              <a:t>26-Sep-17</a:t>
             </a:fld>
             <a:endParaRPr lang="en-US" dirty="0"/>
           </a:p>
@@ -4516,7 +4525,7 @@
             <a:fld id="{B61BEF0D-F0BB-DE4B-95CE-6DB70DBA9567}" type="datetimeFigureOut">
               <a:rPr lang="en-US" dirty="0"/>
               <a:pPr/>
-              <a:t>25-Sep-17</a:t>
+              <a:t>26-Sep-17</a:t>
             </a:fld>
             <a:endParaRPr lang="en-US" dirty="0"/>
           </a:p>
@@ -5256,7 +5265,7 @@
             <a:fld id="{B61BEF0D-F0BB-DE4B-95CE-6DB70DBA9567}" type="datetimeFigureOut">
               <a:rPr lang="en-US" dirty="0"/>
               <a:pPr/>
-              <a:t>25-Sep-17</a:t>
+              <a:t>26-Sep-17</a:t>
             </a:fld>
             <a:endParaRPr lang="en-US" dirty="0"/>
           </a:p>
@@ -5916,6 +5925,12 @@
               <a:t>Similar to the checkout screen, the user can now select which method(s) they want to use to refund the customer.</a:t>
             </a:r>
           </a:p>
+          <a:p>
+            <a:r>
+              <a:rPr lang="en-US" dirty="0"/>
+              <a:t>After the remaining refund amount is 0, click process refund to generate an invoice for the returned items.</a:t>
+            </a:r>
+          </a:p>
         </p:txBody>
       </p:sp>
       <p:pic>
@@ -6058,7 +6073,7 @@
         </p:blipFill>
         <p:spPr>
           <a:xfrm>
-            <a:off x="677334" y="2935115"/>
+            <a:off x="955629" y="2799943"/>
             <a:ext cx="2457450" cy="800100"/>
           </a:xfrm>
           <a:prstGeom prst="rect">
@@ -6163,13 +6178,13 @@
           <a:p>
             <a:r>
               <a:rPr lang="en-US" dirty="0"/>
-              <a:t>Invoice search and viewing function moved here.</a:t>
+              <a:t>Invoice search and viewing function moved to the sales page.</a:t>
             </a:r>
           </a:p>
           <a:p>
             <a:pPr lvl="1"/>
             <a:r>
-              <a:rPr lang="en-US" dirty="0"/>
+              <a:rPr lang="en-US" sz="1200" dirty="0"/>
               <a:t>Previous location: Reports page</a:t>
             </a:r>
           </a:p>
@@ -6312,7 +6327,7 @@
           <a:p>
             <a:pPr lvl="1"/>
             <a:r>
-              <a:rPr lang="en-US" dirty="0"/>
+              <a:rPr lang="en-US" sz="1200" dirty="0"/>
               <a:t>Previous location: Reports page</a:t>
             </a:r>
           </a:p>
@@ -6441,7 +6456,7 @@
           <a:p>
             <a:r>
               <a:rPr lang="en-US" dirty="0"/>
-              <a:t>If an employee forgets their password, a new one can also be assigned using the same method.</a:t>
+              <a:t>If an employee forgets their password, a new one can also be assigned using the edit employee method.</a:t>
             </a:r>
           </a:p>
         </p:txBody>

</xml_diff>